<commit_message>
fix:usr: Changes in design section
</commit_message>
<xml_diff>
--- a/project/S17-IR-P005/report/images/diagrams.pptx
+++ b/project/S17-IR-P005/report/images/diagrams.pptx
@@ -8,6 +8,7 @@
     <p:sldId id="256" r:id="rId2"/>
     <p:sldId id="257" r:id="rId3"/>
     <p:sldId id="258" r:id="rId4"/>
+    <p:sldId id="259" r:id="rId5"/>
   </p:sldIdLst>
   <p:sldSz cx="12192000" cy="6858000"/>
   <p:notesSz cx="6858000" cy="9144000"/>
@@ -106,6 +107,11 @@
       </a:defRPr>
     </a:lvl9pPr>
   </p:defaultTextStyle>
+  <p:extLst>
+    <p:ext uri="{EFAFB233-063F-42B5-8137-9DF3F51BA10A}">
+      <p15:sldGuideLst xmlns:p15="http://schemas.microsoft.com/office/powerpoint/2012/main"/>
+    </p:ext>
+  </p:extLst>
 </p:presentation>
 </file>
 
@@ -240,7 +246,7 @@
           <a:p>
             <a:fld id="{4BE3F30F-F69B-8146-9753-4DC54DA530B4}" type="datetimeFigureOut">
               <a:rPr lang="en-US" smtClean="0"/>
-              <a:t>4/17/17</a:t>
+              <a:t>4/19/17</a:t>
             </a:fld>
             <a:endParaRPr lang="en-US"/>
           </a:p>
@@ -410,7 +416,7 @@
           <a:p>
             <a:fld id="{4BE3F30F-F69B-8146-9753-4DC54DA530B4}" type="datetimeFigureOut">
               <a:rPr lang="en-US" smtClean="0"/>
-              <a:t>4/17/17</a:t>
+              <a:t>4/19/17</a:t>
             </a:fld>
             <a:endParaRPr lang="en-US"/>
           </a:p>
@@ -590,7 +596,7 @@
           <a:p>
             <a:fld id="{4BE3F30F-F69B-8146-9753-4DC54DA530B4}" type="datetimeFigureOut">
               <a:rPr lang="en-US" smtClean="0"/>
-              <a:t>4/17/17</a:t>
+              <a:t>4/19/17</a:t>
             </a:fld>
             <a:endParaRPr lang="en-US"/>
           </a:p>
@@ -760,7 +766,7 @@
           <a:p>
             <a:fld id="{4BE3F30F-F69B-8146-9753-4DC54DA530B4}" type="datetimeFigureOut">
               <a:rPr lang="en-US" smtClean="0"/>
-              <a:t>4/17/17</a:t>
+              <a:t>4/19/17</a:t>
             </a:fld>
             <a:endParaRPr lang="en-US"/>
           </a:p>
@@ -1006,7 +1012,7 @@
           <a:p>
             <a:fld id="{4BE3F30F-F69B-8146-9753-4DC54DA530B4}" type="datetimeFigureOut">
               <a:rPr lang="en-US" smtClean="0"/>
-              <a:t>4/17/17</a:t>
+              <a:t>4/19/17</a:t>
             </a:fld>
             <a:endParaRPr lang="en-US"/>
           </a:p>
@@ -1238,7 +1244,7 @@
           <a:p>
             <a:fld id="{4BE3F30F-F69B-8146-9753-4DC54DA530B4}" type="datetimeFigureOut">
               <a:rPr lang="en-US" smtClean="0"/>
-              <a:t>4/17/17</a:t>
+              <a:t>4/19/17</a:t>
             </a:fld>
             <a:endParaRPr lang="en-US"/>
           </a:p>
@@ -1605,7 +1611,7 @@
           <a:p>
             <a:fld id="{4BE3F30F-F69B-8146-9753-4DC54DA530B4}" type="datetimeFigureOut">
               <a:rPr lang="en-US" smtClean="0"/>
-              <a:t>4/17/17</a:t>
+              <a:t>4/19/17</a:t>
             </a:fld>
             <a:endParaRPr lang="en-US"/>
           </a:p>
@@ -1723,7 +1729,7 @@
           <a:p>
             <a:fld id="{4BE3F30F-F69B-8146-9753-4DC54DA530B4}" type="datetimeFigureOut">
               <a:rPr lang="en-US" smtClean="0"/>
-              <a:t>4/17/17</a:t>
+              <a:t>4/19/17</a:t>
             </a:fld>
             <a:endParaRPr lang="en-US"/>
           </a:p>
@@ -1818,7 +1824,7 @@
           <a:p>
             <a:fld id="{4BE3F30F-F69B-8146-9753-4DC54DA530B4}" type="datetimeFigureOut">
               <a:rPr lang="en-US" smtClean="0"/>
-              <a:t>4/17/17</a:t>
+              <a:t>4/19/17</a:t>
             </a:fld>
             <a:endParaRPr lang="en-US"/>
           </a:p>
@@ -2095,7 +2101,7 @@
           <a:p>
             <a:fld id="{4BE3F30F-F69B-8146-9753-4DC54DA530B4}" type="datetimeFigureOut">
               <a:rPr lang="en-US" smtClean="0"/>
-              <a:t>4/17/17</a:t>
+              <a:t>4/19/17</a:t>
             </a:fld>
             <a:endParaRPr lang="en-US"/>
           </a:p>
@@ -2348,7 +2354,7 @@
           <a:p>
             <a:fld id="{4BE3F30F-F69B-8146-9753-4DC54DA530B4}" type="datetimeFigureOut">
               <a:rPr lang="en-US" smtClean="0"/>
-              <a:t>4/17/17</a:t>
+              <a:t>4/19/17</a:t>
             </a:fld>
             <a:endParaRPr lang="en-US"/>
           </a:p>
@@ -2561,7 +2567,7 @@
           <a:p>
             <a:fld id="{4BE3F30F-F69B-8146-9753-4DC54DA530B4}" type="datetimeFigureOut">
               <a:rPr lang="en-US" smtClean="0"/>
-              <a:t>4/17/17</a:t>
+              <a:t>4/19/17</a:t>
             </a:fld>
             <a:endParaRPr lang="en-US"/>
           </a:p>
@@ -5549,6 +5555,478 @@
 </p:sld>
 </file>
 
+<file path=ppt/slides/slide4.xml><?xml version="1.0" encoding="utf-8"?>
+<p:sld xmlns:a="http://schemas.openxmlformats.org/drawingml/2006/main" xmlns:r="http://schemas.openxmlformats.org/officeDocument/2006/relationships" xmlns:p="http://schemas.openxmlformats.org/presentationml/2006/main">
+  <p:cSld>
+    <p:spTree>
+      <p:nvGrpSpPr>
+        <p:cNvPr id="1" name=""/>
+        <p:cNvGrpSpPr/>
+        <p:nvPr/>
+      </p:nvGrpSpPr>
+      <p:grpSpPr>
+        <a:xfrm>
+          <a:off x="0" y="0"/>
+          <a:ext cx="0" cy="0"/>
+          <a:chOff x="0" y="0"/>
+          <a:chExt cx="0" cy="0"/>
+        </a:xfrm>
+      </p:grpSpPr>
+      <p:sp>
+        <p:nvSpPr>
+          <p:cNvPr id="2" name="Alternate Process 1"/>
+          <p:cNvSpPr/>
+          <p:nvPr/>
+        </p:nvSpPr>
+        <p:spPr>
+          <a:xfrm>
+            <a:off x="336176" y="874058"/>
+            <a:ext cx="1640542" cy="524435"/>
+          </a:xfrm>
+          <a:prstGeom prst="flowChartAlternateProcess">
+            <a:avLst/>
+          </a:prstGeom>
+        </p:spPr>
+        <p:style>
+          <a:lnRef idx="2">
+            <a:schemeClr val="dk1"/>
+          </a:lnRef>
+          <a:fillRef idx="1">
+            <a:schemeClr val="lt1"/>
+          </a:fillRef>
+          <a:effectRef idx="0">
+            <a:schemeClr val="dk1"/>
+          </a:effectRef>
+          <a:fontRef idx="minor">
+            <a:schemeClr val="dk1"/>
+          </a:fontRef>
+        </p:style>
+        <p:txBody>
+          <a:bodyPr rtlCol="0" anchor="ctr"/>
+          <a:lstStyle/>
+          <a:p>
+            <a:pPr algn="ctr"/>
+            <a:r>
+              <a:rPr lang="en-US" sz="1400" dirty="0" smtClean="0"/>
+              <a:t>Read Crawled Documents</a:t>
+            </a:r>
+            <a:endParaRPr lang="en-US" sz="1400" dirty="0"/>
+          </a:p>
+        </p:txBody>
+      </p:sp>
+      <p:sp>
+        <p:nvSpPr>
+          <p:cNvPr id="3" name="Alternate Process 2"/>
+          <p:cNvSpPr/>
+          <p:nvPr/>
+        </p:nvSpPr>
+        <p:spPr>
+          <a:xfrm>
+            <a:off x="3934384" y="874057"/>
+            <a:ext cx="936812" cy="524435"/>
+          </a:xfrm>
+          <a:prstGeom prst="flowChartAlternateProcess">
+            <a:avLst/>
+          </a:prstGeom>
+        </p:spPr>
+        <p:style>
+          <a:lnRef idx="2">
+            <a:schemeClr val="dk1"/>
+          </a:lnRef>
+          <a:fillRef idx="1">
+            <a:schemeClr val="lt1"/>
+          </a:fillRef>
+          <a:effectRef idx="0">
+            <a:schemeClr val="dk1"/>
+          </a:effectRef>
+          <a:fontRef idx="minor">
+            <a:schemeClr val="dk1"/>
+          </a:fontRef>
+        </p:style>
+        <p:txBody>
+          <a:bodyPr rtlCol="0" anchor="ctr"/>
+          <a:lstStyle/>
+          <a:p>
+            <a:pPr algn="ctr"/>
+            <a:r>
+              <a:rPr lang="en-US" sz="1400" smtClean="0"/>
+              <a:t>Tokenize</a:t>
+            </a:r>
+            <a:endParaRPr lang="en-US" sz="1400"/>
+          </a:p>
+        </p:txBody>
+      </p:sp>
+      <p:sp>
+        <p:nvSpPr>
+          <p:cNvPr id="4" name="Alternate Process 3"/>
+          <p:cNvSpPr/>
+          <p:nvPr/>
+        </p:nvSpPr>
+        <p:spPr>
+          <a:xfrm>
+            <a:off x="5080746" y="874057"/>
+            <a:ext cx="1810871" cy="524435"/>
+          </a:xfrm>
+          <a:prstGeom prst="flowChartAlternateProcess">
+            <a:avLst/>
+          </a:prstGeom>
+        </p:spPr>
+        <p:style>
+          <a:lnRef idx="2">
+            <a:schemeClr val="dk1"/>
+          </a:lnRef>
+          <a:fillRef idx="1">
+            <a:schemeClr val="lt1"/>
+          </a:fillRef>
+          <a:effectRef idx="0">
+            <a:schemeClr val="dk1"/>
+          </a:effectRef>
+          <a:fontRef idx="minor">
+            <a:schemeClr val="dk1"/>
+          </a:fontRef>
+        </p:style>
+        <p:txBody>
+          <a:bodyPr rtlCol="0" anchor="ctr"/>
+          <a:lstStyle/>
+          <a:p>
+            <a:pPr algn="ctr"/>
+            <a:r>
+              <a:rPr lang="en-US" sz="1400" smtClean="0"/>
+              <a:t>Remove Stop Words</a:t>
+            </a:r>
+            <a:endParaRPr lang="en-US" sz="1400"/>
+          </a:p>
+        </p:txBody>
+      </p:sp>
+      <p:sp>
+        <p:nvSpPr>
+          <p:cNvPr id="5" name="Alternate Process 4"/>
+          <p:cNvSpPr/>
+          <p:nvPr/>
+        </p:nvSpPr>
+        <p:spPr>
+          <a:xfrm>
+            <a:off x="2310652" y="874057"/>
+            <a:ext cx="1373841" cy="524435"/>
+          </a:xfrm>
+          <a:prstGeom prst="flowChartAlternateProcess">
+            <a:avLst/>
+          </a:prstGeom>
+        </p:spPr>
+        <p:style>
+          <a:lnRef idx="2">
+            <a:schemeClr val="dk1"/>
+          </a:lnRef>
+          <a:fillRef idx="1">
+            <a:schemeClr val="lt1"/>
+          </a:fillRef>
+          <a:effectRef idx="0">
+            <a:schemeClr val="dk1"/>
+          </a:effectRef>
+          <a:fontRef idx="minor">
+            <a:schemeClr val="dk1"/>
+          </a:fontRef>
+        </p:style>
+        <p:txBody>
+          <a:bodyPr rtlCol="0" anchor="ctr"/>
+          <a:lstStyle/>
+          <a:p>
+            <a:pPr algn="ctr"/>
+            <a:r>
+              <a:rPr lang="en-US" sz="1400" dirty="0" smtClean="0"/>
+              <a:t>Remove special characters</a:t>
+            </a:r>
+            <a:endParaRPr lang="en-US" sz="1400" dirty="0"/>
+          </a:p>
+        </p:txBody>
+      </p:sp>
+      <p:sp>
+        <p:nvSpPr>
+          <p:cNvPr id="6" name="Alternate Process 5"/>
+          <p:cNvSpPr/>
+          <p:nvPr/>
+        </p:nvSpPr>
+        <p:spPr>
+          <a:xfrm>
+            <a:off x="7114614" y="874056"/>
+            <a:ext cx="1810871" cy="524435"/>
+          </a:xfrm>
+          <a:prstGeom prst="flowChartAlternateProcess">
+            <a:avLst/>
+          </a:prstGeom>
+        </p:spPr>
+        <p:style>
+          <a:lnRef idx="2">
+            <a:schemeClr val="dk1"/>
+          </a:lnRef>
+          <a:fillRef idx="1">
+            <a:schemeClr val="lt1"/>
+          </a:fillRef>
+          <a:effectRef idx="0">
+            <a:schemeClr val="dk1"/>
+          </a:effectRef>
+          <a:fontRef idx="minor">
+            <a:schemeClr val="dk1"/>
+          </a:fontRef>
+        </p:style>
+        <p:txBody>
+          <a:bodyPr rtlCol="0" anchor="ctr"/>
+          <a:lstStyle/>
+          <a:p>
+            <a:pPr algn="ctr"/>
+            <a:r>
+              <a:rPr lang="en-US" sz="1400" dirty="0" smtClean="0"/>
+              <a:t>Create Word2Vec Model</a:t>
+            </a:r>
+            <a:endParaRPr lang="en-US" sz="1400" dirty="0"/>
+          </a:p>
+        </p:txBody>
+      </p:sp>
+      <p:sp>
+        <p:nvSpPr>
+          <p:cNvPr id="7" name="Alternate Process 6"/>
+          <p:cNvSpPr/>
+          <p:nvPr/>
+        </p:nvSpPr>
+        <p:spPr>
+          <a:xfrm>
+            <a:off x="9148482" y="874055"/>
+            <a:ext cx="1380565" cy="524435"/>
+          </a:xfrm>
+          <a:prstGeom prst="flowChartAlternateProcess">
+            <a:avLst/>
+          </a:prstGeom>
+        </p:spPr>
+        <p:style>
+          <a:lnRef idx="2">
+            <a:schemeClr val="dk1"/>
+          </a:lnRef>
+          <a:fillRef idx="1">
+            <a:schemeClr val="lt1"/>
+          </a:fillRef>
+          <a:effectRef idx="0">
+            <a:schemeClr val="dk1"/>
+          </a:effectRef>
+          <a:fontRef idx="minor">
+            <a:schemeClr val="dk1"/>
+          </a:fontRef>
+        </p:style>
+        <p:txBody>
+          <a:bodyPr rtlCol="0" anchor="ctr"/>
+          <a:lstStyle/>
+          <a:p>
+            <a:pPr algn="ctr"/>
+            <a:r>
+              <a:rPr lang="en-US" sz="1400" smtClean="0"/>
+              <a:t>Save Model</a:t>
+            </a:r>
+            <a:endParaRPr lang="en-US" sz="1400"/>
+          </a:p>
+        </p:txBody>
+      </p:sp>
+      <p:sp>
+        <p:nvSpPr>
+          <p:cNvPr id="8" name="Right Arrow 7"/>
+          <p:cNvSpPr/>
+          <p:nvPr/>
+        </p:nvSpPr>
+        <p:spPr>
+          <a:xfrm>
+            <a:off x="1976718" y="1089212"/>
+            <a:ext cx="322729" cy="134470"/>
+          </a:xfrm>
+          <a:prstGeom prst="rightArrow">
+            <a:avLst/>
+          </a:prstGeom>
+        </p:spPr>
+        <p:style>
+          <a:lnRef idx="2">
+            <a:schemeClr val="dk1"/>
+          </a:lnRef>
+          <a:fillRef idx="1">
+            <a:schemeClr val="lt1"/>
+          </a:fillRef>
+          <a:effectRef idx="0">
+            <a:schemeClr val="dk1"/>
+          </a:effectRef>
+          <a:fontRef idx="minor">
+            <a:schemeClr val="dk1"/>
+          </a:fontRef>
+        </p:style>
+        <p:txBody>
+          <a:bodyPr rtlCol="0" anchor="ctr"/>
+          <a:lstStyle/>
+          <a:p>
+            <a:pPr algn="ctr"/>
+            <a:endParaRPr lang="en-US"/>
+          </a:p>
+        </p:txBody>
+      </p:sp>
+      <p:sp>
+        <p:nvSpPr>
+          <p:cNvPr id="9" name="Right Arrow 8"/>
+          <p:cNvSpPr/>
+          <p:nvPr/>
+        </p:nvSpPr>
+        <p:spPr>
+          <a:xfrm>
+            <a:off x="3695699" y="1082482"/>
+            <a:ext cx="238686" cy="141199"/>
+          </a:xfrm>
+          <a:prstGeom prst="rightArrow">
+            <a:avLst/>
+          </a:prstGeom>
+        </p:spPr>
+        <p:style>
+          <a:lnRef idx="2">
+            <a:schemeClr val="dk1"/>
+          </a:lnRef>
+          <a:fillRef idx="1">
+            <a:schemeClr val="lt1"/>
+          </a:fillRef>
+          <a:effectRef idx="0">
+            <a:schemeClr val="dk1"/>
+          </a:effectRef>
+          <a:fontRef idx="minor">
+            <a:schemeClr val="dk1"/>
+          </a:fontRef>
+        </p:style>
+        <p:txBody>
+          <a:bodyPr rtlCol="0" anchor="ctr"/>
+          <a:lstStyle/>
+          <a:p>
+            <a:pPr algn="ctr"/>
+            <a:endParaRPr lang="en-US"/>
+          </a:p>
+        </p:txBody>
+      </p:sp>
+      <p:sp>
+        <p:nvSpPr>
+          <p:cNvPr id="10" name="Right Arrow 9"/>
+          <p:cNvSpPr/>
+          <p:nvPr/>
+        </p:nvSpPr>
+        <p:spPr>
+          <a:xfrm>
+            <a:off x="4842060" y="1055588"/>
+            <a:ext cx="238686" cy="141199"/>
+          </a:xfrm>
+          <a:prstGeom prst="rightArrow">
+            <a:avLst/>
+          </a:prstGeom>
+        </p:spPr>
+        <p:style>
+          <a:lnRef idx="2">
+            <a:schemeClr val="dk1"/>
+          </a:lnRef>
+          <a:fillRef idx="1">
+            <a:schemeClr val="lt1"/>
+          </a:fillRef>
+          <a:effectRef idx="0">
+            <a:schemeClr val="dk1"/>
+          </a:effectRef>
+          <a:fontRef idx="minor">
+            <a:schemeClr val="dk1"/>
+          </a:fontRef>
+        </p:style>
+        <p:txBody>
+          <a:bodyPr rtlCol="0" anchor="ctr"/>
+          <a:lstStyle/>
+          <a:p>
+            <a:pPr algn="ctr"/>
+            <a:endParaRPr lang="en-US"/>
+          </a:p>
+        </p:txBody>
+      </p:sp>
+      <p:sp>
+        <p:nvSpPr>
+          <p:cNvPr id="11" name="Right Arrow 10"/>
+          <p:cNvSpPr/>
+          <p:nvPr/>
+        </p:nvSpPr>
+        <p:spPr>
+          <a:xfrm>
+            <a:off x="6891617" y="1058950"/>
+            <a:ext cx="238686" cy="141199"/>
+          </a:xfrm>
+          <a:prstGeom prst="rightArrow">
+            <a:avLst/>
+          </a:prstGeom>
+        </p:spPr>
+        <p:style>
+          <a:lnRef idx="2">
+            <a:schemeClr val="dk1"/>
+          </a:lnRef>
+          <a:fillRef idx="1">
+            <a:schemeClr val="lt1"/>
+          </a:fillRef>
+          <a:effectRef idx="0">
+            <a:schemeClr val="dk1"/>
+          </a:effectRef>
+          <a:fontRef idx="minor">
+            <a:schemeClr val="dk1"/>
+          </a:fontRef>
+        </p:style>
+        <p:txBody>
+          <a:bodyPr rtlCol="0" anchor="ctr"/>
+          <a:lstStyle/>
+          <a:p>
+            <a:pPr algn="ctr"/>
+            <a:endParaRPr lang="en-US"/>
+          </a:p>
+        </p:txBody>
+      </p:sp>
+      <p:sp>
+        <p:nvSpPr>
+          <p:cNvPr id="12" name="Right Arrow 11"/>
+          <p:cNvSpPr/>
+          <p:nvPr/>
+        </p:nvSpPr>
+        <p:spPr>
+          <a:xfrm>
+            <a:off x="8912038" y="1055587"/>
+            <a:ext cx="238686" cy="141199"/>
+          </a:xfrm>
+          <a:prstGeom prst="rightArrow">
+            <a:avLst/>
+          </a:prstGeom>
+        </p:spPr>
+        <p:style>
+          <a:lnRef idx="2">
+            <a:schemeClr val="dk1"/>
+          </a:lnRef>
+          <a:fillRef idx="1">
+            <a:schemeClr val="lt1"/>
+          </a:fillRef>
+          <a:effectRef idx="0">
+            <a:schemeClr val="dk1"/>
+          </a:effectRef>
+          <a:fontRef idx="minor">
+            <a:schemeClr val="dk1"/>
+          </a:fontRef>
+        </p:style>
+        <p:txBody>
+          <a:bodyPr rtlCol="0" anchor="ctr"/>
+          <a:lstStyle/>
+          <a:p>
+            <a:pPr algn="ctr"/>
+            <a:endParaRPr lang="en-US"/>
+          </a:p>
+        </p:txBody>
+      </p:sp>
+    </p:spTree>
+    <p:extLst>
+      <p:ext uri="{BB962C8B-B14F-4D97-AF65-F5344CB8AC3E}">
+        <p14:creationId xmlns:p14="http://schemas.microsoft.com/office/powerpoint/2010/main" val="1989228213"/>
+      </p:ext>
+    </p:extLst>
+  </p:cSld>
+  <p:clrMapOvr>
+    <a:masterClrMapping/>
+  </p:clrMapOvr>
+</p:sld>
+</file>
+
 <file path=ppt/theme/theme1.xml><?xml version="1.0" encoding="utf-8"?>
 <a:theme xmlns:a="http://schemas.openxmlformats.org/drawingml/2006/main" name="Office Theme">
   <a:themeElements>

</xml_diff>

<commit_message>
Added empty benchmarking section
</commit_message>
<xml_diff>
--- a/project/S17-IR-P005/report/images/diagrams.pptx
+++ b/project/S17-IR-P005/report/images/diagrams.pptx
@@ -5572,448 +5572,463 @@
           <a:chExt cx="0" cy="0"/>
         </a:xfrm>
       </p:grpSpPr>
-      <p:sp>
-        <p:nvSpPr>
-          <p:cNvPr id="2" name="Alternate Process 1"/>
-          <p:cNvSpPr/>
+      <p:grpSp>
+        <p:nvGrpSpPr>
+          <p:cNvPr id="13" name="Group 12"/>
+          <p:cNvGrpSpPr/>
           <p:nvPr/>
-        </p:nvSpPr>
-        <p:spPr>
+        </p:nvGrpSpPr>
+        <p:grpSpPr>
           <a:xfrm>
-            <a:off x="336176" y="874058"/>
-            <a:ext cx="1640542" cy="524435"/>
+            <a:off x="336176" y="874055"/>
+            <a:ext cx="10192871" cy="524438"/>
+            <a:chOff x="336176" y="874055"/>
+            <a:chExt cx="10192871" cy="524438"/>
           </a:xfrm>
-          <a:prstGeom prst="flowChartAlternateProcess">
-            <a:avLst/>
-          </a:prstGeom>
-        </p:spPr>
-        <p:style>
-          <a:lnRef idx="2">
-            <a:schemeClr val="dk1"/>
-          </a:lnRef>
-          <a:fillRef idx="1">
-            <a:schemeClr val="lt1"/>
-          </a:fillRef>
-          <a:effectRef idx="0">
-            <a:schemeClr val="dk1"/>
-          </a:effectRef>
-          <a:fontRef idx="minor">
-            <a:schemeClr val="dk1"/>
-          </a:fontRef>
-        </p:style>
-        <p:txBody>
-          <a:bodyPr rtlCol="0" anchor="ctr"/>
-          <a:lstStyle/>
-          <a:p>
-            <a:pPr algn="ctr"/>
-            <a:r>
-              <a:rPr lang="en-US" sz="1400" dirty="0" smtClean="0"/>
-              <a:t>Read Crawled Documents</a:t>
-            </a:r>
-            <a:endParaRPr lang="en-US" sz="1400" dirty="0"/>
-          </a:p>
-        </p:txBody>
-      </p:sp>
-      <p:sp>
-        <p:nvSpPr>
-          <p:cNvPr id="3" name="Alternate Process 2"/>
-          <p:cNvSpPr/>
-          <p:nvPr/>
-        </p:nvSpPr>
-        <p:spPr>
-          <a:xfrm>
-            <a:off x="3934384" y="874057"/>
-            <a:ext cx="936812" cy="524435"/>
-          </a:xfrm>
-          <a:prstGeom prst="flowChartAlternateProcess">
-            <a:avLst/>
-          </a:prstGeom>
-        </p:spPr>
-        <p:style>
-          <a:lnRef idx="2">
-            <a:schemeClr val="dk1"/>
-          </a:lnRef>
-          <a:fillRef idx="1">
-            <a:schemeClr val="lt1"/>
-          </a:fillRef>
-          <a:effectRef idx="0">
-            <a:schemeClr val="dk1"/>
-          </a:effectRef>
-          <a:fontRef idx="minor">
-            <a:schemeClr val="dk1"/>
-          </a:fontRef>
-        </p:style>
-        <p:txBody>
-          <a:bodyPr rtlCol="0" anchor="ctr"/>
-          <a:lstStyle/>
-          <a:p>
-            <a:pPr algn="ctr"/>
-            <a:r>
-              <a:rPr lang="en-US" sz="1400" smtClean="0"/>
-              <a:t>Tokenize</a:t>
-            </a:r>
-            <a:endParaRPr lang="en-US" sz="1400"/>
-          </a:p>
-        </p:txBody>
-      </p:sp>
-      <p:sp>
-        <p:nvSpPr>
-          <p:cNvPr id="4" name="Alternate Process 3"/>
-          <p:cNvSpPr/>
-          <p:nvPr/>
-        </p:nvSpPr>
-        <p:spPr>
-          <a:xfrm>
-            <a:off x="5080746" y="874057"/>
-            <a:ext cx="1810871" cy="524435"/>
-          </a:xfrm>
-          <a:prstGeom prst="flowChartAlternateProcess">
-            <a:avLst/>
-          </a:prstGeom>
-        </p:spPr>
-        <p:style>
-          <a:lnRef idx="2">
-            <a:schemeClr val="dk1"/>
-          </a:lnRef>
-          <a:fillRef idx="1">
-            <a:schemeClr val="lt1"/>
-          </a:fillRef>
-          <a:effectRef idx="0">
-            <a:schemeClr val="dk1"/>
-          </a:effectRef>
-          <a:fontRef idx="minor">
-            <a:schemeClr val="dk1"/>
-          </a:fontRef>
-        </p:style>
-        <p:txBody>
-          <a:bodyPr rtlCol="0" anchor="ctr"/>
-          <a:lstStyle/>
-          <a:p>
-            <a:pPr algn="ctr"/>
-            <a:r>
-              <a:rPr lang="en-US" sz="1400" smtClean="0"/>
-              <a:t>Remove Stop Words</a:t>
-            </a:r>
-            <a:endParaRPr lang="en-US" sz="1400"/>
-          </a:p>
-        </p:txBody>
-      </p:sp>
-      <p:sp>
-        <p:nvSpPr>
-          <p:cNvPr id="5" name="Alternate Process 4"/>
-          <p:cNvSpPr/>
-          <p:nvPr/>
-        </p:nvSpPr>
-        <p:spPr>
-          <a:xfrm>
-            <a:off x="2310652" y="874057"/>
-            <a:ext cx="1373841" cy="524435"/>
-          </a:xfrm>
-          <a:prstGeom prst="flowChartAlternateProcess">
-            <a:avLst/>
-          </a:prstGeom>
-        </p:spPr>
-        <p:style>
-          <a:lnRef idx="2">
-            <a:schemeClr val="dk1"/>
-          </a:lnRef>
-          <a:fillRef idx="1">
-            <a:schemeClr val="lt1"/>
-          </a:fillRef>
-          <a:effectRef idx="0">
-            <a:schemeClr val="dk1"/>
-          </a:effectRef>
-          <a:fontRef idx="minor">
-            <a:schemeClr val="dk1"/>
-          </a:fontRef>
-        </p:style>
-        <p:txBody>
-          <a:bodyPr rtlCol="0" anchor="ctr"/>
-          <a:lstStyle/>
-          <a:p>
-            <a:pPr algn="ctr"/>
-            <a:r>
-              <a:rPr lang="en-US" sz="1400" dirty="0" smtClean="0"/>
-              <a:t>Remove special characters</a:t>
-            </a:r>
-            <a:endParaRPr lang="en-US" sz="1400" dirty="0"/>
-          </a:p>
-        </p:txBody>
-      </p:sp>
-      <p:sp>
-        <p:nvSpPr>
-          <p:cNvPr id="6" name="Alternate Process 5"/>
-          <p:cNvSpPr/>
-          <p:nvPr/>
-        </p:nvSpPr>
-        <p:spPr>
-          <a:xfrm>
-            <a:off x="7114614" y="874056"/>
-            <a:ext cx="1810871" cy="524435"/>
-          </a:xfrm>
-          <a:prstGeom prst="flowChartAlternateProcess">
-            <a:avLst/>
-          </a:prstGeom>
-        </p:spPr>
-        <p:style>
-          <a:lnRef idx="2">
-            <a:schemeClr val="dk1"/>
-          </a:lnRef>
-          <a:fillRef idx="1">
-            <a:schemeClr val="lt1"/>
-          </a:fillRef>
-          <a:effectRef idx="0">
-            <a:schemeClr val="dk1"/>
-          </a:effectRef>
-          <a:fontRef idx="minor">
-            <a:schemeClr val="dk1"/>
-          </a:fontRef>
-        </p:style>
-        <p:txBody>
-          <a:bodyPr rtlCol="0" anchor="ctr"/>
-          <a:lstStyle/>
-          <a:p>
-            <a:pPr algn="ctr"/>
-            <a:r>
-              <a:rPr lang="en-US" sz="1400" dirty="0" smtClean="0"/>
-              <a:t>Create Word2Vec Model</a:t>
-            </a:r>
-            <a:endParaRPr lang="en-US" sz="1400" dirty="0"/>
-          </a:p>
-        </p:txBody>
-      </p:sp>
-      <p:sp>
-        <p:nvSpPr>
-          <p:cNvPr id="7" name="Alternate Process 6"/>
-          <p:cNvSpPr/>
-          <p:nvPr/>
-        </p:nvSpPr>
-        <p:spPr>
-          <a:xfrm>
-            <a:off x="9148482" y="874055"/>
-            <a:ext cx="1380565" cy="524435"/>
-          </a:xfrm>
-          <a:prstGeom prst="flowChartAlternateProcess">
-            <a:avLst/>
-          </a:prstGeom>
-        </p:spPr>
-        <p:style>
-          <a:lnRef idx="2">
-            <a:schemeClr val="dk1"/>
-          </a:lnRef>
-          <a:fillRef idx="1">
-            <a:schemeClr val="lt1"/>
-          </a:fillRef>
-          <a:effectRef idx="0">
-            <a:schemeClr val="dk1"/>
-          </a:effectRef>
-          <a:fontRef idx="minor">
-            <a:schemeClr val="dk1"/>
-          </a:fontRef>
-        </p:style>
-        <p:txBody>
-          <a:bodyPr rtlCol="0" anchor="ctr"/>
-          <a:lstStyle/>
-          <a:p>
-            <a:pPr algn="ctr"/>
-            <a:r>
-              <a:rPr lang="en-US" sz="1400" smtClean="0"/>
-              <a:t>Save Model</a:t>
-            </a:r>
-            <a:endParaRPr lang="en-US" sz="1400"/>
-          </a:p>
-        </p:txBody>
-      </p:sp>
-      <p:sp>
-        <p:nvSpPr>
-          <p:cNvPr id="8" name="Right Arrow 7"/>
-          <p:cNvSpPr/>
-          <p:nvPr/>
-        </p:nvSpPr>
-        <p:spPr>
-          <a:xfrm>
-            <a:off x="1976718" y="1089212"/>
-            <a:ext cx="322729" cy="134470"/>
-          </a:xfrm>
-          <a:prstGeom prst="rightArrow">
-            <a:avLst/>
-          </a:prstGeom>
-        </p:spPr>
-        <p:style>
-          <a:lnRef idx="2">
-            <a:schemeClr val="dk1"/>
-          </a:lnRef>
-          <a:fillRef idx="1">
-            <a:schemeClr val="lt1"/>
-          </a:fillRef>
-          <a:effectRef idx="0">
-            <a:schemeClr val="dk1"/>
-          </a:effectRef>
-          <a:fontRef idx="minor">
-            <a:schemeClr val="dk1"/>
-          </a:fontRef>
-        </p:style>
-        <p:txBody>
-          <a:bodyPr rtlCol="0" anchor="ctr"/>
-          <a:lstStyle/>
-          <a:p>
-            <a:pPr algn="ctr"/>
-            <a:endParaRPr lang="en-US"/>
-          </a:p>
-        </p:txBody>
-      </p:sp>
-      <p:sp>
-        <p:nvSpPr>
-          <p:cNvPr id="9" name="Right Arrow 8"/>
-          <p:cNvSpPr/>
-          <p:nvPr/>
-        </p:nvSpPr>
-        <p:spPr>
-          <a:xfrm>
-            <a:off x="3695699" y="1082482"/>
-            <a:ext cx="238686" cy="141199"/>
-          </a:xfrm>
-          <a:prstGeom prst="rightArrow">
-            <a:avLst/>
-          </a:prstGeom>
-        </p:spPr>
-        <p:style>
-          <a:lnRef idx="2">
-            <a:schemeClr val="dk1"/>
-          </a:lnRef>
-          <a:fillRef idx="1">
-            <a:schemeClr val="lt1"/>
-          </a:fillRef>
-          <a:effectRef idx="0">
-            <a:schemeClr val="dk1"/>
-          </a:effectRef>
-          <a:fontRef idx="minor">
-            <a:schemeClr val="dk1"/>
-          </a:fontRef>
-        </p:style>
-        <p:txBody>
-          <a:bodyPr rtlCol="0" anchor="ctr"/>
-          <a:lstStyle/>
-          <a:p>
-            <a:pPr algn="ctr"/>
-            <a:endParaRPr lang="en-US"/>
-          </a:p>
-        </p:txBody>
-      </p:sp>
-      <p:sp>
-        <p:nvSpPr>
-          <p:cNvPr id="10" name="Right Arrow 9"/>
-          <p:cNvSpPr/>
-          <p:nvPr/>
-        </p:nvSpPr>
-        <p:spPr>
-          <a:xfrm>
-            <a:off x="4842060" y="1055588"/>
-            <a:ext cx="238686" cy="141199"/>
-          </a:xfrm>
-          <a:prstGeom prst="rightArrow">
-            <a:avLst/>
-          </a:prstGeom>
-        </p:spPr>
-        <p:style>
-          <a:lnRef idx="2">
-            <a:schemeClr val="dk1"/>
-          </a:lnRef>
-          <a:fillRef idx="1">
-            <a:schemeClr val="lt1"/>
-          </a:fillRef>
-          <a:effectRef idx="0">
-            <a:schemeClr val="dk1"/>
-          </a:effectRef>
-          <a:fontRef idx="minor">
-            <a:schemeClr val="dk1"/>
-          </a:fontRef>
-        </p:style>
-        <p:txBody>
-          <a:bodyPr rtlCol="0" anchor="ctr"/>
-          <a:lstStyle/>
-          <a:p>
-            <a:pPr algn="ctr"/>
-            <a:endParaRPr lang="en-US"/>
-          </a:p>
-        </p:txBody>
-      </p:sp>
-      <p:sp>
-        <p:nvSpPr>
-          <p:cNvPr id="11" name="Right Arrow 10"/>
-          <p:cNvSpPr/>
-          <p:nvPr/>
-        </p:nvSpPr>
-        <p:spPr>
-          <a:xfrm>
-            <a:off x="6891617" y="1058950"/>
-            <a:ext cx="238686" cy="141199"/>
-          </a:xfrm>
-          <a:prstGeom prst="rightArrow">
-            <a:avLst/>
-          </a:prstGeom>
-        </p:spPr>
-        <p:style>
-          <a:lnRef idx="2">
-            <a:schemeClr val="dk1"/>
-          </a:lnRef>
-          <a:fillRef idx="1">
-            <a:schemeClr val="lt1"/>
-          </a:fillRef>
-          <a:effectRef idx="0">
-            <a:schemeClr val="dk1"/>
-          </a:effectRef>
-          <a:fontRef idx="minor">
-            <a:schemeClr val="dk1"/>
-          </a:fontRef>
-        </p:style>
-        <p:txBody>
-          <a:bodyPr rtlCol="0" anchor="ctr"/>
-          <a:lstStyle/>
-          <a:p>
-            <a:pPr algn="ctr"/>
-            <a:endParaRPr lang="en-US"/>
-          </a:p>
-        </p:txBody>
-      </p:sp>
-      <p:sp>
-        <p:nvSpPr>
-          <p:cNvPr id="12" name="Right Arrow 11"/>
-          <p:cNvSpPr/>
-          <p:nvPr/>
-        </p:nvSpPr>
-        <p:spPr>
-          <a:xfrm>
-            <a:off x="8912038" y="1055587"/>
-            <a:ext cx="238686" cy="141199"/>
-          </a:xfrm>
-          <a:prstGeom prst="rightArrow">
-            <a:avLst/>
-          </a:prstGeom>
-        </p:spPr>
-        <p:style>
-          <a:lnRef idx="2">
-            <a:schemeClr val="dk1"/>
-          </a:lnRef>
-          <a:fillRef idx="1">
-            <a:schemeClr val="lt1"/>
-          </a:fillRef>
-          <a:effectRef idx="0">
-            <a:schemeClr val="dk1"/>
-          </a:effectRef>
-          <a:fontRef idx="minor">
-            <a:schemeClr val="dk1"/>
-          </a:fontRef>
-        </p:style>
-        <p:txBody>
-          <a:bodyPr rtlCol="0" anchor="ctr"/>
-          <a:lstStyle/>
-          <a:p>
-            <a:pPr algn="ctr"/>
-            <a:endParaRPr lang="en-US"/>
-          </a:p>
-        </p:txBody>
-      </p:sp>
+        </p:grpSpPr>
+        <p:sp>
+          <p:nvSpPr>
+            <p:cNvPr id="2" name="Alternate Process 1"/>
+            <p:cNvSpPr/>
+            <p:nvPr/>
+          </p:nvSpPr>
+          <p:spPr>
+            <a:xfrm>
+              <a:off x="336176" y="874058"/>
+              <a:ext cx="1640542" cy="524435"/>
+            </a:xfrm>
+            <a:prstGeom prst="flowChartAlternateProcess">
+              <a:avLst/>
+            </a:prstGeom>
+          </p:spPr>
+          <p:style>
+            <a:lnRef idx="2">
+              <a:schemeClr val="dk1"/>
+            </a:lnRef>
+            <a:fillRef idx="1">
+              <a:schemeClr val="lt1"/>
+            </a:fillRef>
+            <a:effectRef idx="0">
+              <a:schemeClr val="dk1"/>
+            </a:effectRef>
+            <a:fontRef idx="minor">
+              <a:schemeClr val="dk1"/>
+            </a:fontRef>
+          </p:style>
+          <p:txBody>
+            <a:bodyPr rtlCol="0" anchor="ctr"/>
+            <a:lstStyle/>
+            <a:p>
+              <a:pPr algn="ctr"/>
+              <a:r>
+                <a:rPr lang="en-US" sz="1400" dirty="0" smtClean="0"/>
+                <a:t>Read Crawled Documents</a:t>
+              </a:r>
+              <a:endParaRPr lang="en-US" sz="1400" dirty="0"/>
+            </a:p>
+          </p:txBody>
+        </p:sp>
+        <p:sp>
+          <p:nvSpPr>
+            <p:cNvPr id="3" name="Alternate Process 2"/>
+            <p:cNvSpPr/>
+            <p:nvPr/>
+          </p:nvSpPr>
+          <p:spPr>
+            <a:xfrm>
+              <a:off x="3934384" y="874057"/>
+              <a:ext cx="936812" cy="524435"/>
+            </a:xfrm>
+            <a:prstGeom prst="flowChartAlternateProcess">
+              <a:avLst/>
+            </a:prstGeom>
+          </p:spPr>
+          <p:style>
+            <a:lnRef idx="2">
+              <a:schemeClr val="dk1"/>
+            </a:lnRef>
+            <a:fillRef idx="1">
+              <a:schemeClr val="lt1"/>
+            </a:fillRef>
+            <a:effectRef idx="0">
+              <a:schemeClr val="dk1"/>
+            </a:effectRef>
+            <a:fontRef idx="minor">
+              <a:schemeClr val="dk1"/>
+            </a:fontRef>
+          </p:style>
+          <p:txBody>
+            <a:bodyPr rtlCol="0" anchor="ctr"/>
+            <a:lstStyle/>
+            <a:p>
+              <a:pPr algn="ctr"/>
+              <a:r>
+                <a:rPr lang="en-US" sz="1400" smtClean="0"/>
+                <a:t>Tokenize</a:t>
+              </a:r>
+              <a:endParaRPr lang="en-US" sz="1400"/>
+            </a:p>
+          </p:txBody>
+        </p:sp>
+        <p:sp>
+          <p:nvSpPr>
+            <p:cNvPr id="4" name="Alternate Process 3"/>
+            <p:cNvSpPr/>
+            <p:nvPr/>
+          </p:nvSpPr>
+          <p:spPr>
+            <a:xfrm>
+              <a:off x="5080746" y="874057"/>
+              <a:ext cx="1810871" cy="524435"/>
+            </a:xfrm>
+            <a:prstGeom prst="flowChartAlternateProcess">
+              <a:avLst/>
+            </a:prstGeom>
+          </p:spPr>
+          <p:style>
+            <a:lnRef idx="2">
+              <a:schemeClr val="dk1"/>
+            </a:lnRef>
+            <a:fillRef idx="1">
+              <a:schemeClr val="lt1"/>
+            </a:fillRef>
+            <a:effectRef idx="0">
+              <a:schemeClr val="dk1"/>
+            </a:effectRef>
+            <a:fontRef idx="minor">
+              <a:schemeClr val="dk1"/>
+            </a:fontRef>
+          </p:style>
+          <p:txBody>
+            <a:bodyPr rtlCol="0" anchor="ctr"/>
+            <a:lstStyle/>
+            <a:p>
+              <a:pPr algn="ctr"/>
+              <a:r>
+                <a:rPr lang="en-US" sz="1400" smtClean="0"/>
+                <a:t>Remove Stop Words</a:t>
+              </a:r>
+              <a:endParaRPr lang="en-US" sz="1400"/>
+            </a:p>
+          </p:txBody>
+        </p:sp>
+        <p:sp>
+          <p:nvSpPr>
+            <p:cNvPr id="5" name="Alternate Process 4"/>
+            <p:cNvSpPr/>
+            <p:nvPr/>
+          </p:nvSpPr>
+          <p:spPr>
+            <a:xfrm>
+              <a:off x="2310652" y="874057"/>
+              <a:ext cx="1373841" cy="524435"/>
+            </a:xfrm>
+            <a:prstGeom prst="flowChartAlternateProcess">
+              <a:avLst/>
+            </a:prstGeom>
+          </p:spPr>
+          <p:style>
+            <a:lnRef idx="2">
+              <a:schemeClr val="dk1"/>
+            </a:lnRef>
+            <a:fillRef idx="1">
+              <a:schemeClr val="lt1"/>
+            </a:fillRef>
+            <a:effectRef idx="0">
+              <a:schemeClr val="dk1"/>
+            </a:effectRef>
+            <a:fontRef idx="minor">
+              <a:schemeClr val="dk1"/>
+            </a:fontRef>
+          </p:style>
+          <p:txBody>
+            <a:bodyPr rtlCol="0" anchor="ctr"/>
+            <a:lstStyle/>
+            <a:p>
+              <a:pPr algn="ctr"/>
+              <a:r>
+                <a:rPr lang="en-US" sz="1400" dirty="0" smtClean="0"/>
+                <a:t>Remove special characters</a:t>
+              </a:r>
+              <a:endParaRPr lang="en-US" sz="1400" dirty="0"/>
+            </a:p>
+          </p:txBody>
+        </p:sp>
+        <p:sp>
+          <p:nvSpPr>
+            <p:cNvPr id="6" name="Alternate Process 5"/>
+            <p:cNvSpPr/>
+            <p:nvPr/>
+          </p:nvSpPr>
+          <p:spPr>
+            <a:xfrm>
+              <a:off x="7114614" y="874056"/>
+              <a:ext cx="1810871" cy="524435"/>
+            </a:xfrm>
+            <a:prstGeom prst="flowChartAlternateProcess">
+              <a:avLst/>
+            </a:prstGeom>
+          </p:spPr>
+          <p:style>
+            <a:lnRef idx="2">
+              <a:schemeClr val="dk1"/>
+            </a:lnRef>
+            <a:fillRef idx="1">
+              <a:schemeClr val="lt1"/>
+            </a:fillRef>
+            <a:effectRef idx="0">
+              <a:schemeClr val="dk1"/>
+            </a:effectRef>
+            <a:fontRef idx="minor">
+              <a:schemeClr val="dk1"/>
+            </a:fontRef>
+          </p:style>
+          <p:txBody>
+            <a:bodyPr rtlCol="0" anchor="ctr"/>
+            <a:lstStyle/>
+            <a:p>
+              <a:pPr algn="ctr"/>
+              <a:r>
+                <a:rPr lang="en-US" sz="1400" dirty="0" smtClean="0"/>
+                <a:t>Create Word2Vec Model</a:t>
+              </a:r>
+              <a:endParaRPr lang="en-US" sz="1400" dirty="0"/>
+            </a:p>
+          </p:txBody>
+        </p:sp>
+        <p:sp>
+          <p:nvSpPr>
+            <p:cNvPr id="7" name="Alternate Process 6"/>
+            <p:cNvSpPr/>
+            <p:nvPr/>
+          </p:nvSpPr>
+          <p:spPr>
+            <a:xfrm>
+              <a:off x="9148482" y="874055"/>
+              <a:ext cx="1380565" cy="524435"/>
+            </a:xfrm>
+            <a:prstGeom prst="flowChartAlternateProcess">
+              <a:avLst/>
+            </a:prstGeom>
+          </p:spPr>
+          <p:style>
+            <a:lnRef idx="2">
+              <a:schemeClr val="dk1"/>
+            </a:lnRef>
+            <a:fillRef idx="1">
+              <a:schemeClr val="lt1"/>
+            </a:fillRef>
+            <a:effectRef idx="0">
+              <a:schemeClr val="dk1"/>
+            </a:effectRef>
+            <a:fontRef idx="minor">
+              <a:schemeClr val="dk1"/>
+            </a:fontRef>
+          </p:style>
+          <p:txBody>
+            <a:bodyPr rtlCol="0" anchor="ctr"/>
+            <a:lstStyle/>
+            <a:p>
+              <a:pPr algn="ctr"/>
+              <a:r>
+                <a:rPr lang="en-US" sz="1400" smtClean="0"/>
+                <a:t>Save Model</a:t>
+              </a:r>
+              <a:endParaRPr lang="en-US" sz="1400"/>
+            </a:p>
+          </p:txBody>
+        </p:sp>
+        <p:sp>
+          <p:nvSpPr>
+            <p:cNvPr id="8" name="Right Arrow 7"/>
+            <p:cNvSpPr/>
+            <p:nvPr/>
+          </p:nvSpPr>
+          <p:spPr>
+            <a:xfrm>
+              <a:off x="1976718" y="1089212"/>
+              <a:ext cx="322729" cy="134470"/>
+            </a:xfrm>
+            <a:prstGeom prst="rightArrow">
+              <a:avLst/>
+            </a:prstGeom>
+          </p:spPr>
+          <p:style>
+            <a:lnRef idx="2">
+              <a:schemeClr val="dk1"/>
+            </a:lnRef>
+            <a:fillRef idx="1">
+              <a:schemeClr val="lt1"/>
+            </a:fillRef>
+            <a:effectRef idx="0">
+              <a:schemeClr val="dk1"/>
+            </a:effectRef>
+            <a:fontRef idx="minor">
+              <a:schemeClr val="dk1"/>
+            </a:fontRef>
+          </p:style>
+          <p:txBody>
+            <a:bodyPr rtlCol="0" anchor="ctr"/>
+            <a:lstStyle/>
+            <a:p>
+              <a:pPr algn="ctr"/>
+              <a:endParaRPr lang="en-US"/>
+            </a:p>
+          </p:txBody>
+        </p:sp>
+        <p:sp>
+          <p:nvSpPr>
+            <p:cNvPr id="9" name="Right Arrow 8"/>
+            <p:cNvSpPr/>
+            <p:nvPr/>
+          </p:nvSpPr>
+          <p:spPr>
+            <a:xfrm>
+              <a:off x="3695699" y="1082482"/>
+              <a:ext cx="238686" cy="141199"/>
+            </a:xfrm>
+            <a:prstGeom prst="rightArrow">
+              <a:avLst/>
+            </a:prstGeom>
+          </p:spPr>
+          <p:style>
+            <a:lnRef idx="2">
+              <a:schemeClr val="dk1"/>
+            </a:lnRef>
+            <a:fillRef idx="1">
+              <a:schemeClr val="lt1"/>
+            </a:fillRef>
+            <a:effectRef idx="0">
+              <a:schemeClr val="dk1"/>
+            </a:effectRef>
+            <a:fontRef idx="minor">
+              <a:schemeClr val="dk1"/>
+            </a:fontRef>
+          </p:style>
+          <p:txBody>
+            <a:bodyPr rtlCol="0" anchor="ctr"/>
+            <a:lstStyle/>
+            <a:p>
+              <a:pPr algn="ctr"/>
+              <a:endParaRPr lang="en-US"/>
+            </a:p>
+          </p:txBody>
+        </p:sp>
+        <p:sp>
+          <p:nvSpPr>
+            <p:cNvPr id="10" name="Right Arrow 9"/>
+            <p:cNvSpPr/>
+            <p:nvPr/>
+          </p:nvSpPr>
+          <p:spPr>
+            <a:xfrm>
+              <a:off x="4842060" y="1055588"/>
+              <a:ext cx="238686" cy="141199"/>
+            </a:xfrm>
+            <a:prstGeom prst="rightArrow">
+              <a:avLst/>
+            </a:prstGeom>
+          </p:spPr>
+          <p:style>
+            <a:lnRef idx="2">
+              <a:schemeClr val="dk1"/>
+            </a:lnRef>
+            <a:fillRef idx="1">
+              <a:schemeClr val="lt1"/>
+            </a:fillRef>
+            <a:effectRef idx="0">
+              <a:schemeClr val="dk1"/>
+            </a:effectRef>
+            <a:fontRef idx="minor">
+              <a:schemeClr val="dk1"/>
+            </a:fontRef>
+          </p:style>
+          <p:txBody>
+            <a:bodyPr rtlCol="0" anchor="ctr"/>
+            <a:lstStyle/>
+            <a:p>
+              <a:pPr algn="ctr"/>
+              <a:endParaRPr lang="en-US"/>
+            </a:p>
+          </p:txBody>
+        </p:sp>
+        <p:sp>
+          <p:nvSpPr>
+            <p:cNvPr id="11" name="Right Arrow 10"/>
+            <p:cNvSpPr/>
+            <p:nvPr/>
+          </p:nvSpPr>
+          <p:spPr>
+            <a:xfrm>
+              <a:off x="6891617" y="1058950"/>
+              <a:ext cx="238686" cy="141199"/>
+            </a:xfrm>
+            <a:prstGeom prst="rightArrow">
+              <a:avLst/>
+            </a:prstGeom>
+          </p:spPr>
+          <p:style>
+            <a:lnRef idx="2">
+              <a:schemeClr val="dk1"/>
+            </a:lnRef>
+            <a:fillRef idx="1">
+              <a:schemeClr val="lt1"/>
+            </a:fillRef>
+            <a:effectRef idx="0">
+              <a:schemeClr val="dk1"/>
+            </a:effectRef>
+            <a:fontRef idx="minor">
+              <a:schemeClr val="dk1"/>
+            </a:fontRef>
+          </p:style>
+          <p:txBody>
+            <a:bodyPr rtlCol="0" anchor="ctr"/>
+            <a:lstStyle/>
+            <a:p>
+              <a:pPr algn="ctr"/>
+              <a:endParaRPr lang="en-US"/>
+            </a:p>
+          </p:txBody>
+        </p:sp>
+        <p:sp>
+          <p:nvSpPr>
+            <p:cNvPr id="12" name="Right Arrow 11"/>
+            <p:cNvSpPr/>
+            <p:nvPr/>
+          </p:nvSpPr>
+          <p:spPr>
+            <a:xfrm>
+              <a:off x="8912038" y="1055587"/>
+              <a:ext cx="238686" cy="141199"/>
+            </a:xfrm>
+            <a:prstGeom prst="rightArrow">
+              <a:avLst/>
+            </a:prstGeom>
+          </p:spPr>
+          <p:style>
+            <a:lnRef idx="2">
+              <a:schemeClr val="dk1"/>
+            </a:lnRef>
+            <a:fillRef idx="1">
+              <a:schemeClr val="lt1"/>
+            </a:fillRef>
+            <a:effectRef idx="0">
+              <a:schemeClr val="dk1"/>
+            </a:effectRef>
+            <a:fontRef idx="minor">
+              <a:schemeClr val="dk1"/>
+            </a:fontRef>
+          </p:style>
+          <p:txBody>
+            <a:bodyPr rtlCol="0" anchor="ctr"/>
+            <a:lstStyle/>
+            <a:p>
+              <a:pPr algn="ctr"/>
+              <a:endParaRPr lang="en-US"/>
+            </a:p>
+          </p:txBody>
+        </p:sp>
+      </p:grpSp>
     </p:spTree>
     <p:extLst>
       <p:ext uri="{BB962C8B-B14F-4D97-AF65-F5344CB8AC3E}">

</xml_diff>